<commit_message>
powerpoint to be revised
</commit_message>
<xml_diff>
--- a/Assignment 2/Jarvis x spotify.pptx
+++ b/Assignment 2/Jarvis x spotify.pptx
@@ -225,7 +225,7 @@
           <a:p>
             <a:fld id="{D1CB9CF0-A540-4793-A5F3-F4917CFDDCB6}" type="datetimeFigureOut">
               <a:rPr lang="en-US" smtClean="0"/>
-              <a:t>3/25/2022</a:t>
+              <a:t>3/28/2022</a:t>
             </a:fld>
             <a:endParaRPr lang="en-US" dirty="0"/>
           </a:p>
@@ -402,7 +402,7 @@
           <a:p>
             <a:fld id="{EDA03753-A5BE-4D79-AEA9-C0A65A6F8851}" type="datetimeFigureOut">
               <a:rPr lang="en-US" smtClean="0"/>
-              <a:t>3/25/2022</a:t>
+              <a:t>3/28/2022</a:t>
             </a:fld>
             <a:endParaRPr lang="en-US" dirty="0"/>
           </a:p>
@@ -16031,17 +16031,43 @@
         <p:spPr/>
         <p:txBody>
           <a:bodyPr>
-            <a:normAutofit lnSpcReduction="10000"/>
+            <a:normAutofit/>
           </a:bodyPr>
           <a:lstStyle/>
           <a:p>
-            <a:pPr marL="0" indent="0">
-              <a:buNone/>
+            <a:pPr>
+              <a:buFontTx/>
+              <a:buChar char="-"/>
             </a:pPr>
             <a:r>
               <a:rPr lang="en-US" dirty="0"/>
-              <a:t>Lorem ipsum dolor sit amet, consectetur adipiscing elit. Ut gravida eros erat. Proin a tellus sed risus lobortis sagittis eu quis est. Duis ut aliquam nisi. Suspendisse vehicula mi diam, sit amet lacinia massa sodales ac. Fusce condimentum egestas nunc a maximus. Quisque et orci purus. Proin dolor mi, ultrices sit amet ipsum placerat, congue mattis turpis. Donec vestibulum eros eget mauris dignissim, ut ultricies dolor vi Lorem ipsum dolor sit amet, consectetur adipiscing elit. Ut gravida eros erat. Proin a tellus sed risus lobortis sagittis eu quis est. Duis ut aliquam nisi. Suspendisse vehicula mi diam, sit amet lacinia massa sodales ac. Fusce condimentum egestas nunc a maximus. </a:t>
+              <a:t>Needs to stay on top of the industry</a:t>
             </a:r>
+          </a:p>
+          <a:p>
+            <a:pPr lvl="1">
+              <a:buFontTx/>
+              <a:buChar char="-"/>
+            </a:pPr>
+            <a:r>
+              <a:rPr lang="en-US" dirty="0"/>
+              <a:t>Newly introduced: Podcasts of all kinds (learning, languages, entertainment etc.)</a:t>
+            </a:r>
+          </a:p>
+          <a:p>
+            <a:pPr lvl="1">
+              <a:buFontTx/>
+              <a:buChar char="-"/>
+            </a:pPr>
+            <a:r>
+              <a:rPr lang="en-US" dirty="0"/>
+              <a:t>The service requires expansion to uphold its monopoly of music </a:t>
+            </a:r>
+            <a:r>
+              <a:rPr lang="en-US"/>
+              <a:t>streaming services.</a:t>
+            </a:r>
+            <a:endParaRPr lang="en-US" dirty="0"/>
           </a:p>
         </p:txBody>
       </p:sp>
@@ -17962,7 +17988,7 @@
         </p:blipFill>
         <p:spPr bwMode="auto">
           <a:xfrm>
-            <a:off x="6185140" y="-454"/>
+            <a:off x="6198995" y="-454"/>
             <a:ext cx="6013688" cy="6858453"/>
           </a:xfrm>
           <a:prstGeom prst="rect">
@@ -17980,6 +18006,337 @@
           </a:extLst>
         </p:spPr>
       </p:pic>
+      <p:sp>
+        <p:nvSpPr>
+          <p:cNvPr id="11" name="Rectangle 10">
+            <a:extLst>
+              <a:ext uri="{FF2B5EF4-FFF2-40B4-BE49-F238E27FC236}">
+                <a16:creationId xmlns:a16="http://schemas.microsoft.com/office/drawing/2014/main" id="{82EB412E-5278-4051-9FE4-C20DD2DA0912}"/>
+              </a:ext>
+              <a:ext uri="{C183D7F6-B498-43B3-948B-1728B52AA6E4}">
+                <adec:decorative xmlns:adec="http://schemas.microsoft.com/office/drawing/2017/decorative" val="1"/>
+              </a:ext>
+            </a:extLst>
+          </p:cNvPr>
+          <p:cNvSpPr/>
+          <p:nvPr/>
+        </p:nvSpPr>
+        <p:spPr>
+          <a:xfrm>
+            <a:off x="6198995" y="0"/>
+            <a:ext cx="6117770" cy="6858000"/>
+          </a:xfrm>
+          <a:prstGeom prst="rect">
+            <a:avLst/>
+          </a:prstGeom>
+          <a:solidFill>
+            <a:schemeClr val="bg1">
+              <a:alpha val="72000"/>
+            </a:schemeClr>
+          </a:solidFill>
+          <a:ln>
+            <a:noFill/>
+          </a:ln>
+        </p:spPr>
+        <p:style>
+          <a:lnRef idx="2">
+            <a:schemeClr val="accent1">
+              <a:shade val="50000"/>
+            </a:schemeClr>
+          </a:lnRef>
+          <a:fillRef idx="1">
+            <a:schemeClr val="accent1"/>
+          </a:fillRef>
+          <a:effectRef idx="0">
+            <a:schemeClr val="accent1"/>
+          </a:effectRef>
+          <a:fontRef idx="minor">
+            <a:schemeClr val="lt1"/>
+          </a:fontRef>
+        </p:style>
+        <p:txBody>
+          <a:bodyPr rtlCol="0" anchor="ctr"/>
+          <a:lstStyle/>
+          <a:p>
+            <a:pPr algn="ctr"/>
+            <a:r>
+              <a:rPr lang="en-US" dirty="0"/>
+              <a:t>2</a:t>
+            </a:r>
+          </a:p>
+          <a:p>
+            <a:pPr algn="ctr"/>
+            <a:endParaRPr lang="en-US" dirty="0"/>
+          </a:p>
+          <a:p>
+            <a:pPr algn="ctr"/>
+            <a:endParaRPr lang="en-US" dirty="0"/>
+          </a:p>
+          <a:p>
+            <a:pPr algn="ctr"/>
+            <a:endParaRPr lang="en-US" dirty="0"/>
+          </a:p>
+          <a:p>
+            <a:pPr algn="ctr"/>
+            <a:endParaRPr lang="en-US" dirty="0"/>
+          </a:p>
+          <a:p>
+            <a:pPr algn="ctr"/>
+            <a:endParaRPr lang="en-US" dirty="0"/>
+          </a:p>
+          <a:p>
+            <a:pPr algn="ctr"/>
+            <a:endParaRPr lang="en-US" dirty="0"/>
+          </a:p>
+          <a:p>
+            <a:pPr algn="ctr"/>
+            <a:endParaRPr lang="en-US" dirty="0"/>
+          </a:p>
+          <a:p>
+            <a:pPr algn="ctr"/>
+            <a:endParaRPr lang="en-US" dirty="0"/>
+          </a:p>
+          <a:p>
+            <a:pPr algn="ctr"/>
+            <a:endParaRPr lang="en-US" dirty="0"/>
+          </a:p>
+          <a:p>
+            <a:pPr algn="ctr"/>
+            <a:endParaRPr lang="en-US" dirty="0"/>
+          </a:p>
+          <a:p>
+            <a:pPr algn="ctr"/>
+            <a:endParaRPr lang="en-US" dirty="0"/>
+          </a:p>
+          <a:p>
+            <a:pPr algn="ctr"/>
+            <a:endParaRPr lang="en-US" dirty="0"/>
+          </a:p>
+          <a:p>
+            <a:pPr algn="ctr"/>
+            <a:endParaRPr lang="en-US" dirty="0"/>
+          </a:p>
+          <a:p>
+            <a:pPr algn="ctr"/>
+            <a:endParaRPr lang="en-US" dirty="0"/>
+          </a:p>
+          <a:p>
+            <a:pPr algn="ctr"/>
+            <a:endParaRPr lang="en-US" dirty="0"/>
+          </a:p>
+          <a:p>
+            <a:pPr algn="ctr"/>
+            <a:endParaRPr lang="en-US" dirty="0"/>
+          </a:p>
+          <a:p>
+            <a:pPr algn="ctr"/>
+            <a:endParaRPr lang="en-US" dirty="0"/>
+          </a:p>
+          <a:p>
+            <a:pPr algn="ctr"/>
+            <a:endParaRPr lang="en-US" dirty="0"/>
+          </a:p>
+          <a:p>
+            <a:pPr algn="ctr"/>
+            <a:endParaRPr lang="en-US" dirty="0"/>
+          </a:p>
+          <a:p>
+            <a:pPr algn="ctr"/>
+            <a:endParaRPr lang="en-US" dirty="0"/>
+          </a:p>
+          <a:p>
+            <a:pPr algn="ctr"/>
+            <a:endParaRPr lang="en-US" dirty="0"/>
+          </a:p>
+          <a:p>
+            <a:pPr algn="ctr"/>
+            <a:endParaRPr lang="en-US" dirty="0"/>
+          </a:p>
+          <a:p>
+            <a:pPr algn="ctr"/>
+            <a:endParaRPr lang="en-US" dirty="0"/>
+          </a:p>
+          <a:p>
+            <a:pPr algn="ctr"/>
+            <a:endParaRPr lang="en-US" dirty="0"/>
+          </a:p>
+          <a:p>
+            <a:pPr algn="ctr"/>
+            <a:endParaRPr lang="en-US" dirty="0"/>
+          </a:p>
+          <a:p>
+            <a:pPr algn="ctr"/>
+            <a:endParaRPr lang="en-US" dirty="0"/>
+          </a:p>
+          <a:p>
+            <a:pPr algn="ctr"/>
+            <a:endParaRPr lang="en-US" dirty="0"/>
+          </a:p>
+          <a:p>
+            <a:pPr algn="ctr"/>
+            <a:endParaRPr lang="en-US" dirty="0"/>
+          </a:p>
+          <a:p>
+            <a:pPr algn="ctr"/>
+            <a:endParaRPr lang="en-US" dirty="0"/>
+          </a:p>
+          <a:p>
+            <a:pPr algn="ctr"/>
+            <a:endParaRPr lang="en-US" dirty="0"/>
+          </a:p>
+          <a:p>
+            <a:pPr algn="ctr"/>
+            <a:endParaRPr lang="en-US" dirty="0"/>
+          </a:p>
+          <a:p>
+            <a:pPr algn="ctr"/>
+            <a:endParaRPr lang="en-US" dirty="0"/>
+          </a:p>
+          <a:p>
+            <a:pPr algn="ctr"/>
+            <a:endParaRPr lang="en-US" dirty="0"/>
+          </a:p>
+          <a:p>
+            <a:pPr algn="ctr"/>
+            <a:endParaRPr lang="en-US" dirty="0"/>
+          </a:p>
+          <a:p>
+            <a:pPr algn="ctr"/>
+            <a:endParaRPr lang="en-US" dirty="0"/>
+          </a:p>
+          <a:p>
+            <a:pPr algn="ctr"/>
+            <a:endParaRPr lang="en-US" dirty="0"/>
+          </a:p>
+          <a:p>
+            <a:pPr algn="ctr"/>
+            <a:endParaRPr lang="en-US" dirty="0"/>
+          </a:p>
+          <a:p>
+            <a:pPr algn="ctr"/>
+            <a:endParaRPr lang="en-US" dirty="0"/>
+          </a:p>
+          <a:p>
+            <a:pPr algn="ctr"/>
+            <a:endParaRPr lang="en-US" dirty="0"/>
+          </a:p>
+          <a:p>
+            <a:pPr algn="ctr"/>
+            <a:endParaRPr lang="en-US" dirty="0"/>
+          </a:p>
+          <a:p>
+            <a:pPr algn="ctr"/>
+            <a:endParaRPr lang="en-US" dirty="0"/>
+          </a:p>
+          <a:p>
+            <a:pPr algn="ctr"/>
+            <a:endParaRPr lang="en-US" dirty="0"/>
+          </a:p>
+          <a:p>
+            <a:pPr algn="ctr"/>
+            <a:endParaRPr lang="en-US" dirty="0"/>
+          </a:p>
+          <a:p>
+            <a:pPr algn="ctr"/>
+            <a:endParaRPr lang="en-US" dirty="0"/>
+          </a:p>
+          <a:p>
+            <a:pPr algn="ctr"/>
+            <a:endParaRPr lang="en-US" dirty="0"/>
+          </a:p>
+          <a:p>
+            <a:pPr algn="ctr"/>
+            <a:endParaRPr lang="en-US" dirty="0"/>
+          </a:p>
+          <a:p>
+            <a:pPr algn="ctr"/>
+            <a:endParaRPr lang="en-US" dirty="0"/>
+          </a:p>
+          <a:p>
+            <a:pPr algn="ctr"/>
+            <a:endParaRPr lang="en-US" dirty="0"/>
+          </a:p>
+          <a:p>
+            <a:pPr algn="ctr"/>
+            <a:endParaRPr lang="en-US" dirty="0"/>
+          </a:p>
+          <a:p>
+            <a:pPr algn="ctr"/>
+            <a:endParaRPr lang="en-US" dirty="0"/>
+          </a:p>
+          <a:p>
+            <a:pPr algn="ctr"/>
+            <a:endParaRPr lang="en-US" dirty="0"/>
+          </a:p>
+          <a:p>
+            <a:pPr algn="ctr"/>
+            <a:endParaRPr lang="en-US" dirty="0"/>
+          </a:p>
+          <a:p>
+            <a:pPr algn="ctr"/>
+            <a:endParaRPr lang="en-US" dirty="0"/>
+          </a:p>
+          <a:p>
+            <a:pPr algn="ctr"/>
+            <a:endParaRPr lang="en-US" dirty="0"/>
+          </a:p>
+          <a:p>
+            <a:pPr algn="ctr"/>
+            <a:endParaRPr lang="en-US" dirty="0"/>
+          </a:p>
+          <a:p>
+            <a:pPr algn="ctr"/>
+            <a:endParaRPr lang="en-US" dirty="0"/>
+          </a:p>
+          <a:p>
+            <a:pPr algn="ctr"/>
+            <a:endParaRPr lang="en-US" dirty="0"/>
+          </a:p>
+          <a:p>
+            <a:pPr algn="ctr"/>
+            <a:endParaRPr lang="en-US" dirty="0"/>
+          </a:p>
+          <a:p>
+            <a:pPr algn="ctr"/>
+            <a:endParaRPr lang="en-US" dirty="0"/>
+          </a:p>
+          <a:p>
+            <a:pPr algn="ctr"/>
+            <a:endParaRPr lang="en-US" dirty="0"/>
+          </a:p>
+          <a:p>
+            <a:pPr algn="ctr"/>
+            <a:endParaRPr lang="en-US" dirty="0"/>
+          </a:p>
+          <a:p>
+            <a:pPr algn="ctr"/>
+            <a:endParaRPr lang="en-US" dirty="0"/>
+          </a:p>
+          <a:p>
+            <a:pPr algn="ctr"/>
+            <a:endParaRPr lang="en-US" dirty="0"/>
+          </a:p>
+          <a:p>
+            <a:pPr algn="ctr"/>
+            <a:endParaRPr lang="en-US" dirty="0"/>
+          </a:p>
+          <a:p>
+            <a:pPr algn="ctr"/>
+            <a:endParaRPr lang="en-US" dirty="0"/>
+          </a:p>
+          <a:p>
+            <a:pPr algn="ctr"/>
+            <a:r>
+              <a:rPr lang="en-US" dirty="0"/>
+              <a:t>+</a:t>
+            </a:r>
+          </a:p>
+          <a:p>
+            <a:pPr algn="ctr"/>
+            <a:endParaRPr lang="en-US" dirty="0"/>
+          </a:p>
+        </p:txBody>
+      </p:sp>
       <p:sp>
         <p:nvSpPr>
           <p:cNvPr id="12" name="Rectangle 11">
@@ -18460,7 +18817,25 @@
           <a:p>
             <a:r>
               <a:rPr lang="en-US" dirty="0"/>
-              <a:t>Don Norman – Affordance, signifiers, feedback (Design of everyday things)</a:t>
+              <a:t>Affordance – relationship between how an object and a user interact </a:t>
+            </a:r>
+          </a:p>
+          <a:p>
+            <a:r>
+              <a:rPr lang="en-US" dirty="0"/>
+              <a:t>Signifier – communicates the affordance to the user</a:t>
+            </a:r>
+          </a:p>
+          <a:p>
+            <a:r>
+              <a:rPr lang="en-US" dirty="0"/>
+              <a:t>Feedback – communicates an action you expect to happen as a consequence of the user’s interaction </a:t>
+            </a:r>
+          </a:p>
+          <a:p>
+            <a:r>
+              <a:rPr lang="en-US" dirty="0"/>
+              <a:t>Don Norman – Design of Everyday Things</a:t>
             </a:r>
           </a:p>
         </p:txBody>
@@ -19064,7 +19439,7 @@
           <a:p>
             <a:r>
               <a:rPr lang="en-US" dirty="0"/>
-              <a:t>SUBTITLE GOES HERE</a:t>
+              <a:t>“Unsettle the present”</a:t>
             </a:r>
           </a:p>
         </p:txBody>
@@ -19088,17 +19463,35 @@
         <p:spPr/>
         <p:txBody>
           <a:bodyPr>
-            <a:normAutofit lnSpcReduction="10000"/>
+            <a:normAutofit/>
           </a:bodyPr>
           <a:lstStyle/>
+          <a:p>
+            <a:r>
+              <a:rPr lang="en-US" dirty="0"/>
+              <a:t>Associates to future of society </a:t>
+            </a:r>
+          </a:p>
+          <a:p>
+            <a:r>
+              <a:rPr lang="en-US" dirty="0"/>
+              <a:t>Widen perspectives </a:t>
+            </a:r>
+          </a:p>
+          <a:p>
+            <a:r>
+              <a:rPr lang="en-US" dirty="0"/>
+              <a:t>A.I intelligence </a:t>
+            </a:r>
+          </a:p>
+          <a:p>
+            <a:endParaRPr lang="en-US" dirty="0"/>
+          </a:p>
           <a:p>
             <a:pPr marL="0" indent="0">
               <a:buNone/>
             </a:pPr>
-            <a:r>
-              <a:rPr lang="en-US" dirty="0"/>
-              <a:t>Lorem ipsum dolor sit amet, consectetur adipiscing elit. Ut gravida eros erat. Proin a tellus sed risus lobortis sagittis eu quis est. Duis ut aliquam nisi. Suspendisse vehicula mi diam, sit amet lacinia massa sodales ac. Fusce condimentum egestas nunc a maximus. Quisque et orci purus. Proin dolor mi, ultrices sit amet ipsum placerat, congue mattis turpis. Donec vestibulum eros eget mauris dignissim, ut ultricies dolor vi Lorem ipsum dolor sit amet, consectetur adipiscing elit. Ut gravida eros erat. Proin a tellus sed risus lobortis sagittis eu quis est. Duis ut aliquam nisi. Suspendisse vehicula mi diam, sit amet lacinia massa sodales ac. Fusce condimentum egestas nunc a maximus. </a:t>
-            </a:r>
+            <a:endParaRPr lang="en-US" dirty="0"/>
           </a:p>
         </p:txBody>
       </p:sp>
@@ -19226,19 +19619,19 @@
           <a:p>
             <a:r>
               <a:rPr lang="en-US" dirty="0"/>
-              <a:t>Lorem ipsum dolor sit amet, consectetur adipiscing elit. Ut gravida eros erat. </a:t>
+              <a:t>Find the root issue</a:t>
             </a:r>
           </a:p>
           <a:p>
             <a:r>
               <a:rPr lang="en-US" dirty="0"/>
-              <a:t>Proin a tellus sed risus lobortis sagittis eu quis est. Duis ut aliquam nisi. Suspendisse vehicula mi diam, </a:t>
+              <a:t>Make multiple solutions </a:t>
             </a:r>
           </a:p>
           <a:p>
             <a:r>
               <a:rPr lang="en-US" dirty="0"/>
-              <a:t>sit amet lacinia massa sodales ac. Fusce condimentum egestas nunc a  </a:t>
+              <a:t>Propose the best solution</a:t>
             </a:r>
           </a:p>
         </p:txBody>
@@ -19296,19 +19689,13 @@
           <a:p>
             <a:r>
               <a:rPr lang="en-US" dirty="0"/>
-              <a:t>Lorem ipsum dolor sit amet, consectetur adipiscing elit. Ut gravida eros erat. </a:t>
+              <a:t>“Solving the right problem, and doing so in a way that meets human needs and capabilities”</a:t>
             </a:r>
           </a:p>
           <a:p>
             <a:r>
               <a:rPr lang="en-US" dirty="0"/>
-              <a:t>Proin a tellus sed risus lobortis sagittis eu quis est. Duis ut aliquam nisi. Suspendisse vehicula mi diam, </a:t>
-            </a:r>
-          </a:p>
-          <a:p>
-            <a:r>
-              <a:rPr lang="en-US" dirty="0"/>
-              <a:t>sit amet lacinia massa sodales ac. Fusce condimentum egestas nunc a</a:t>
+              <a:t>“A brilliant solution to the wrong problem can be worse than no solution at all” </a:t>
             </a:r>
           </a:p>
         </p:txBody>
@@ -20479,16 +20866,37 @@
         <p:spPr/>
         <p:txBody>
           <a:bodyPr>
-            <a:normAutofit fontScale="85000" lnSpcReduction="10000"/>
+            <a:normAutofit/>
           </a:bodyPr>
           <a:lstStyle/>
           <a:p>
-            <a:pPr marL="0" indent="0">
-              <a:buNone/>
-            </a:pPr>
             <a:r>
               <a:rPr lang="en-US" dirty="0"/>
-              <a:t>Lorem ipsum dolor sit amet, consectetur adipiscing elit. Ut gravida eros erat. Proin a tellus sed risus lobortis sagittis eu quis est. Duis ut aliquam nisi. Suspendisse vehicula mi diam, sit amet lacinia massa sodales ac. Fusce condimentum egestas nunc a maximus. Quisque et orci purus. Proin dolor mi, ultrices sit amet ipsum placerat, congue mattis turpis. Donec vestibulum eros eget mauris dignissim, ut ultricies dolor viverra. Phasellus efficitur ante nec sem convallis, in ornare est accumsan. Lorem ipsum dolor sit amet, consectetur adipiscing elit. Ut gravida eros erat. Proin a tellus sed risus lobortis sagittis eu quis est. </a:t>
+              <a:t>Founded in 2006</a:t>
+            </a:r>
+          </a:p>
+          <a:p>
+            <a:r>
+              <a:rPr lang="en-US" dirty="0"/>
+              <a:t>Streaming service</a:t>
+            </a:r>
+          </a:p>
+          <a:p>
+            <a:r>
+              <a:rPr lang="en-US" dirty="0"/>
+              <a:t>Provided a solution for music records which were suffering from illegal downloads</a:t>
+            </a:r>
+          </a:p>
+          <a:p>
+            <a:r>
+              <a:rPr lang="en-US" dirty="0"/>
+              <a:t>Only available in 6 large European Countries on launch</a:t>
+            </a:r>
+          </a:p>
+          <a:p>
+            <a:r>
+              <a:rPr lang="en-US" dirty="0"/>
+              <a:t>Went through a lot of prototypes/trials before going onto other countries for full release</a:t>
             </a:r>
           </a:p>
         </p:txBody>
@@ -20567,19 +20975,54 @@
         </p:nvPicPr>
         <p:blipFill rotWithShape="1">
           <a:blip r:embed="rId2"/>
-          <a:srcRect l="9453" t="14860" r="55330" b="16026"/>
+          <a:srcRect l="9453" t="16428" r="57993" b="25664"/>
           <a:stretch/>
         </p:blipFill>
         <p:spPr>
           <a:xfrm>
-            <a:off x="5993429" y="0"/>
-            <a:ext cx="6212321" cy="6858000"/>
+            <a:off x="6459193" y="152400"/>
+            <a:ext cx="5621971" cy="5625445"/>
           </a:xfrm>
           <a:prstGeom prst="rect">
             <a:avLst/>
           </a:prstGeom>
         </p:spPr>
       </p:pic>
+      <p:sp>
+        <p:nvSpPr>
+          <p:cNvPr id="5" name="TextBox 4">
+            <a:extLst>
+              <a:ext uri="{FF2B5EF4-FFF2-40B4-BE49-F238E27FC236}">
+                <a16:creationId xmlns:a16="http://schemas.microsoft.com/office/drawing/2014/main" id="{D6AEC1AF-487F-4469-AF7B-472870C5A76B}"/>
+              </a:ext>
+            </a:extLst>
+          </p:cNvPr>
+          <p:cNvSpPr txBox="1"/>
+          <p:nvPr/>
+        </p:nvSpPr>
+        <p:spPr>
+          <a:xfrm>
+            <a:off x="6459193" y="5679397"/>
+            <a:ext cx="5746661" cy="646331"/>
+          </a:xfrm>
+          <a:prstGeom prst="rect">
+            <a:avLst/>
+          </a:prstGeom>
+          <a:noFill/>
+        </p:spPr>
+        <p:txBody>
+          <a:bodyPr wrap="square" rtlCol="0">
+            <a:spAutoFit/>
+          </a:bodyPr>
+          <a:lstStyle/>
+          <a:p>
+            <a:r>
+              <a:rPr lang="en-GB" dirty="0"/>
+              <a:t>The iterative cycle of human design – Design of Everyday Things – Don Norman</a:t>
+            </a:r>
+          </a:p>
+        </p:txBody>
+      </p:sp>
     </p:spTree>
     <p:extLst>
       <p:ext uri="{BB962C8B-B14F-4D97-AF65-F5344CB8AC3E}">
@@ -21029,14 +21472,15 @@
         </p:nvSpPr>
         <p:spPr/>
         <p:txBody>
-          <a:bodyPr/>
+          <a:bodyPr>
+            <a:normAutofit fontScale="90000"/>
+          </a:bodyPr>
           <a:lstStyle/>
           <a:p>
             <a:r>
-              <a:rPr lang="en-US" dirty="0" err="1"/>
-              <a:t>napster</a:t>
+              <a:rPr lang="en-US" dirty="0"/>
+              <a:t>Napster and music services</a:t>
             </a:r>
-            <a:endParaRPr lang="en-US" dirty="0"/>
           </a:p>
         </p:txBody>
       </p:sp>
@@ -21091,10 +21535,63 @@
         </p:nvSpPr>
         <p:spPr/>
         <p:txBody>
-          <a:bodyPr/>
+          <a:bodyPr>
+            <a:normAutofit/>
+          </a:bodyPr>
           <a:lstStyle/>
           <a:p>
-            <a:endParaRPr lang="en-US" dirty="0"/>
+            <a:pPr marL="285750" indent="-285750">
+              <a:buFont typeface="Arial" panose="020B0604020202020204" pitchFamily="34" charset="0"/>
+              <a:buChar char="•"/>
+            </a:pPr>
+            <a:r>
+              <a:rPr lang="en-US" dirty="0"/>
+              <a:t>Developed in 1998 </a:t>
+            </a:r>
+          </a:p>
+          <a:p>
+            <a:pPr marL="285750" indent="-285750">
+              <a:buFont typeface="Arial" panose="020B0604020202020204" pitchFamily="34" charset="0"/>
+              <a:buChar char="•"/>
+            </a:pPr>
+            <a:r>
+              <a:rPr lang="en-US" dirty="0"/>
+              <a:t>Music became more accessible - download induvial songs instead of buying a whole album</a:t>
+            </a:r>
+          </a:p>
+          <a:p>
+            <a:pPr marL="285750" indent="-285750">
+              <a:buFont typeface="Arial" panose="020B0604020202020204" pitchFamily="34" charset="0"/>
+              <a:buChar char="•"/>
+            </a:pPr>
+            <a:r>
+              <a:rPr lang="en-US" dirty="0"/>
+              <a:t>70 million members by 2001</a:t>
+            </a:r>
+          </a:p>
+          <a:p>
+            <a:pPr marL="285750" indent="-285750">
+              <a:buFont typeface="Arial" panose="020B0604020202020204" pitchFamily="34" charset="0"/>
+              <a:buChar char="•"/>
+            </a:pPr>
+            <a:r>
+              <a:rPr lang="en-US" dirty="0"/>
+              <a:t>CD stores lost revenue and shut down </a:t>
+            </a:r>
+          </a:p>
+          <a:p>
+            <a:pPr marL="285750" indent="-285750">
+              <a:buFont typeface="Arial" panose="020B0604020202020204" pitchFamily="34" charset="0"/>
+              <a:buChar char="•"/>
+            </a:pPr>
+            <a:r>
+              <a:rPr lang="en-US" dirty="0" err="1"/>
+              <a:t>Itunes</a:t>
+            </a:r>
+            <a:r>
+              <a:rPr lang="en-US" dirty="0"/>
+              <a:t> founded in 2003 – made distribution easier and  cheaper</a:t>
+            </a:r>
           </a:p>
         </p:txBody>
       </p:sp>
@@ -21274,10 +21771,15 @@
             <p:ph idx="1"/>
           </p:nvPr>
         </p:nvSpPr>
-        <p:spPr/>
+        <p:spPr>
+          <a:xfrm>
+            <a:off x="599167" y="2145234"/>
+            <a:ext cx="4226024" cy="1692475"/>
+          </a:xfrm>
+        </p:spPr>
         <p:txBody>
           <a:bodyPr>
-            <a:normAutofit fontScale="85000" lnSpcReduction="10000"/>
+            <a:normAutofit lnSpcReduction="10000"/>
           </a:bodyPr>
           <a:lstStyle/>
           <a:p>
@@ -21286,8 +21788,56 @@
             </a:pPr>
             <a:r>
               <a:rPr lang="en-US" dirty="0"/>
-              <a:t>Lorem ipsum dolor sit amet, consectetur adipiscing elit. Ut gravida eros erat. Proin a tellus sed risus lobortis sagittis eu quis est. Duis ut aliquam nisi. Suspendisse vehicula mi diam, sit amet lacinia massa sodales ac. Fusce condimentum egestas nunc a maximus. Quisque et orci purus. Proin dolor mi, ultrices sit amet ipsum placerat, congue mattis turpis. Donec vestibulum eros eget mauris dignissim, ut ultricies dolor viverra. Phasellus efficitur ante nec sem convallis, in ornare est accumsan. Lorem ipsum dolor sit amet, consectetur adipiscing elit. Ut gravida eros erat. Proin a tellus sed risus lobortis sagittis eu quis est. </a:t>
+              <a:t>Main Competitors: Apple Music, YouTube Music &amp; Amazon Music.</a:t>
             </a:r>
+          </a:p>
+          <a:p>
+            <a:pPr>
+              <a:buFontTx/>
+              <a:buChar char="-"/>
+            </a:pPr>
+            <a:r>
+              <a:rPr lang="en-US" dirty="0"/>
+              <a:t>Majority of revenue from subscriptions.</a:t>
+            </a:r>
+          </a:p>
+          <a:p>
+            <a:pPr>
+              <a:lnSpc>
+                <a:spcPct val="110000"/>
+              </a:lnSpc>
+              <a:buFontTx/>
+              <a:buChar char="-"/>
+            </a:pPr>
+            <a:r>
+              <a:rPr lang="en-US" dirty="0"/>
+              <a:t>Free version brings revenue through Ads</a:t>
+            </a:r>
+          </a:p>
+          <a:p>
+            <a:pPr>
+              <a:buFontTx/>
+              <a:buChar char="-"/>
+            </a:pPr>
+            <a:endParaRPr lang="en-US" dirty="0"/>
+          </a:p>
+          <a:p>
+            <a:pPr marL="0" indent="0">
+              <a:buNone/>
+            </a:pPr>
+            <a:endParaRPr lang="en-US" dirty="0"/>
+          </a:p>
+          <a:p>
+            <a:pPr marL="0" indent="0">
+              <a:buNone/>
+            </a:pPr>
+            <a:endParaRPr lang="en-US" dirty="0"/>
+          </a:p>
+          <a:p>
+            <a:pPr marL="0" indent="0">
+              <a:buNone/>
+            </a:pPr>
+            <a:endParaRPr lang="en-US" dirty="0"/>
           </a:p>
         </p:txBody>
       </p:sp>
@@ -21316,6 +21866,471 @@
               <a:rPr lang="en-US" dirty="0"/>
               <a:t>Add a Footer</a:t>
             </a:r>
+          </a:p>
+        </p:txBody>
+      </p:sp>
+      <p:sp>
+        <p:nvSpPr>
+          <p:cNvPr id="7" name="Text Placeholder 3">
+            <a:extLst>
+              <a:ext uri="{FF2B5EF4-FFF2-40B4-BE49-F238E27FC236}">
+                <a16:creationId xmlns:a16="http://schemas.microsoft.com/office/drawing/2014/main" id="{FE3658E9-09D1-4B92-9BDE-95D27F34E639}"/>
+              </a:ext>
+            </a:extLst>
+          </p:cNvPr>
+          <p:cNvSpPr txBox="1">
+            <a:spLocks/>
+          </p:cNvSpPr>
+          <p:nvPr/>
+        </p:nvSpPr>
+        <p:spPr>
+          <a:xfrm>
+            <a:off x="595884" y="3837709"/>
+            <a:ext cx="4197802" cy="407670"/>
+          </a:xfrm>
+          <a:prstGeom prst="rect">
+            <a:avLst/>
+          </a:prstGeom>
+        </p:spPr>
+        <p:txBody>
+          <a:bodyPr vert="horz" lIns="0" tIns="45720" rIns="0" bIns="45720" rtlCol="0">
+            <a:noAutofit/>
+          </a:bodyPr>
+          <a:lstStyle>
+            <a:lvl1pPr marL="0" indent="0" algn="l" defTabSz="914400" rtl="0" eaLnBrk="1" latinLnBrk="0" hangingPunct="1">
+              <a:lnSpc>
+                <a:spcPct val="90000"/>
+              </a:lnSpc>
+              <a:spcBef>
+                <a:spcPts val="1000"/>
+              </a:spcBef>
+              <a:buFont typeface="Arial" panose="020B0604020202020204" pitchFamily="34" charset="0"/>
+              <a:buNone/>
+              <a:defRPr sz="2000" kern="1200" spc="600">
+                <a:solidFill>
+                  <a:srgbClr val="2F3342"/>
+                </a:solidFill>
+                <a:latin typeface="+mj-lt"/>
+                <a:ea typeface="+mn-ea"/>
+                <a:cs typeface="+mn-cs"/>
+              </a:defRPr>
+            </a:lvl1pPr>
+            <a:lvl2pPr marL="457200" indent="0" algn="l" defTabSz="914400" rtl="0" eaLnBrk="1" latinLnBrk="0" hangingPunct="1">
+              <a:lnSpc>
+                <a:spcPct val="90000"/>
+              </a:lnSpc>
+              <a:spcBef>
+                <a:spcPts val="500"/>
+              </a:spcBef>
+              <a:buFont typeface="Arial" panose="020B0604020202020204" pitchFamily="34" charset="0"/>
+              <a:buNone/>
+              <a:defRPr sz="2000" kern="1200">
+                <a:solidFill>
+                  <a:schemeClr val="tx1">
+                    <a:tint val="75000"/>
+                  </a:schemeClr>
+                </a:solidFill>
+                <a:latin typeface="+mn-lt"/>
+                <a:ea typeface="+mn-ea"/>
+                <a:cs typeface="+mn-cs"/>
+              </a:defRPr>
+            </a:lvl2pPr>
+            <a:lvl3pPr marL="914400" indent="0" algn="l" defTabSz="914400" rtl="0" eaLnBrk="1" latinLnBrk="0" hangingPunct="1">
+              <a:lnSpc>
+                <a:spcPct val="90000"/>
+              </a:lnSpc>
+              <a:spcBef>
+                <a:spcPts val="500"/>
+              </a:spcBef>
+              <a:buFont typeface="Arial" panose="020B0604020202020204" pitchFamily="34" charset="0"/>
+              <a:buNone/>
+              <a:defRPr sz="1800" kern="1200">
+                <a:solidFill>
+                  <a:schemeClr val="tx1">
+                    <a:tint val="75000"/>
+                  </a:schemeClr>
+                </a:solidFill>
+                <a:latin typeface="+mn-lt"/>
+                <a:ea typeface="+mn-ea"/>
+                <a:cs typeface="+mn-cs"/>
+              </a:defRPr>
+            </a:lvl3pPr>
+            <a:lvl4pPr marL="1371600" indent="0" algn="l" defTabSz="914400" rtl="0" eaLnBrk="1" latinLnBrk="0" hangingPunct="1">
+              <a:lnSpc>
+                <a:spcPct val="90000"/>
+              </a:lnSpc>
+              <a:spcBef>
+                <a:spcPts val="500"/>
+              </a:spcBef>
+              <a:buFont typeface="Arial" panose="020B0604020202020204" pitchFamily="34" charset="0"/>
+              <a:buNone/>
+              <a:defRPr sz="1600" kern="1200">
+                <a:solidFill>
+                  <a:schemeClr val="tx1">
+                    <a:tint val="75000"/>
+                  </a:schemeClr>
+                </a:solidFill>
+                <a:latin typeface="+mn-lt"/>
+                <a:ea typeface="+mn-ea"/>
+                <a:cs typeface="+mn-cs"/>
+              </a:defRPr>
+            </a:lvl4pPr>
+            <a:lvl5pPr marL="1828800" indent="0" algn="l" defTabSz="914400" rtl="0" eaLnBrk="1" latinLnBrk="0" hangingPunct="1">
+              <a:lnSpc>
+                <a:spcPct val="90000"/>
+              </a:lnSpc>
+              <a:spcBef>
+                <a:spcPts val="500"/>
+              </a:spcBef>
+              <a:buFont typeface="Arial" panose="020B0604020202020204" pitchFamily="34" charset="0"/>
+              <a:buNone/>
+              <a:defRPr sz="1600" kern="1200">
+                <a:solidFill>
+                  <a:schemeClr val="tx1">
+                    <a:tint val="75000"/>
+                  </a:schemeClr>
+                </a:solidFill>
+                <a:latin typeface="+mn-lt"/>
+                <a:ea typeface="+mn-ea"/>
+                <a:cs typeface="+mn-cs"/>
+              </a:defRPr>
+            </a:lvl5pPr>
+            <a:lvl6pPr marL="2286000" indent="0" algn="l" defTabSz="914400" rtl="0" eaLnBrk="1" latinLnBrk="0" hangingPunct="1">
+              <a:lnSpc>
+                <a:spcPct val="90000"/>
+              </a:lnSpc>
+              <a:spcBef>
+                <a:spcPts val="500"/>
+              </a:spcBef>
+              <a:buFont typeface="Arial" panose="020B0604020202020204" pitchFamily="34" charset="0"/>
+              <a:buNone/>
+              <a:defRPr sz="1600" kern="1200">
+                <a:solidFill>
+                  <a:schemeClr val="tx1">
+                    <a:tint val="75000"/>
+                  </a:schemeClr>
+                </a:solidFill>
+                <a:latin typeface="+mn-lt"/>
+                <a:ea typeface="+mn-ea"/>
+                <a:cs typeface="+mn-cs"/>
+              </a:defRPr>
+            </a:lvl6pPr>
+            <a:lvl7pPr marL="2743200" indent="0" algn="l" defTabSz="914400" rtl="0" eaLnBrk="1" latinLnBrk="0" hangingPunct="1">
+              <a:lnSpc>
+                <a:spcPct val="90000"/>
+              </a:lnSpc>
+              <a:spcBef>
+                <a:spcPts val="500"/>
+              </a:spcBef>
+              <a:buFont typeface="Arial" panose="020B0604020202020204" pitchFamily="34" charset="0"/>
+              <a:buNone/>
+              <a:defRPr sz="1600" kern="1200">
+                <a:solidFill>
+                  <a:schemeClr val="tx1">
+                    <a:tint val="75000"/>
+                  </a:schemeClr>
+                </a:solidFill>
+                <a:latin typeface="+mn-lt"/>
+                <a:ea typeface="+mn-ea"/>
+                <a:cs typeface="+mn-cs"/>
+              </a:defRPr>
+            </a:lvl7pPr>
+            <a:lvl8pPr marL="3200400" indent="0" algn="l" defTabSz="914400" rtl="0" eaLnBrk="1" latinLnBrk="0" hangingPunct="1">
+              <a:lnSpc>
+                <a:spcPct val="90000"/>
+              </a:lnSpc>
+              <a:spcBef>
+                <a:spcPts val="500"/>
+              </a:spcBef>
+              <a:buFont typeface="Arial" panose="020B0604020202020204" pitchFamily="34" charset="0"/>
+              <a:buNone/>
+              <a:defRPr sz="1600" kern="1200">
+                <a:solidFill>
+                  <a:schemeClr val="tx1">
+                    <a:tint val="75000"/>
+                  </a:schemeClr>
+                </a:solidFill>
+                <a:latin typeface="+mn-lt"/>
+                <a:ea typeface="+mn-ea"/>
+                <a:cs typeface="+mn-cs"/>
+              </a:defRPr>
+            </a:lvl8pPr>
+            <a:lvl9pPr marL="3657600" indent="0" algn="l" defTabSz="914400" rtl="0" eaLnBrk="1" latinLnBrk="0" hangingPunct="1">
+              <a:lnSpc>
+                <a:spcPct val="90000"/>
+              </a:lnSpc>
+              <a:spcBef>
+                <a:spcPts val="500"/>
+              </a:spcBef>
+              <a:buFont typeface="Arial" panose="020B0604020202020204" pitchFamily="34" charset="0"/>
+              <a:buNone/>
+              <a:defRPr sz="1600" kern="1200">
+                <a:solidFill>
+                  <a:schemeClr val="tx1">
+                    <a:tint val="75000"/>
+                  </a:schemeClr>
+                </a:solidFill>
+                <a:latin typeface="+mn-lt"/>
+                <a:ea typeface="+mn-ea"/>
+                <a:cs typeface="+mn-cs"/>
+              </a:defRPr>
+            </a:lvl9pPr>
+          </a:lstStyle>
+          <a:p>
+            <a:r>
+              <a:rPr lang="en-US" dirty="0"/>
+              <a:t>Spotify as a Monopoly:</a:t>
+            </a:r>
+          </a:p>
+        </p:txBody>
+      </p:sp>
+      <p:sp>
+        <p:nvSpPr>
+          <p:cNvPr id="8" name="Content Placeholder 2">
+            <a:extLst>
+              <a:ext uri="{FF2B5EF4-FFF2-40B4-BE49-F238E27FC236}">
+                <a16:creationId xmlns:a16="http://schemas.microsoft.com/office/drawing/2014/main" id="{5B03B2C0-E461-43CC-8A3C-B98811E2A0E4}"/>
+              </a:ext>
+            </a:extLst>
+          </p:cNvPr>
+          <p:cNvSpPr txBox="1">
+            <a:spLocks/>
+          </p:cNvSpPr>
+          <p:nvPr/>
+        </p:nvSpPr>
+        <p:spPr>
+          <a:xfrm>
+            <a:off x="611804" y="4309952"/>
+            <a:ext cx="4226024" cy="1966157"/>
+          </a:xfrm>
+          <a:prstGeom prst="rect">
+            <a:avLst/>
+          </a:prstGeom>
+        </p:spPr>
+        <p:txBody>
+          <a:bodyPr vert="horz" lIns="0" tIns="45720" rIns="0" bIns="45720" rtlCol="0">
+            <a:normAutofit/>
+          </a:bodyPr>
+          <a:lstStyle>
+            <a:lvl1pPr marL="228600" indent="-228600" algn="l" defTabSz="914400" rtl="0" eaLnBrk="1" latinLnBrk="0" hangingPunct="1">
+              <a:lnSpc>
+                <a:spcPct val="150000"/>
+              </a:lnSpc>
+              <a:spcBef>
+                <a:spcPts val="1000"/>
+              </a:spcBef>
+              <a:buFont typeface="Arial" panose="020B0604020202020204" pitchFamily="34" charset="0"/>
+              <a:buChar char="•"/>
+              <a:defRPr sz="1600" kern="1200">
+                <a:solidFill>
+                  <a:srgbClr val="2F3342"/>
+                </a:solidFill>
+                <a:latin typeface="+mn-lt"/>
+                <a:ea typeface="+mn-ea"/>
+                <a:cs typeface="+mn-cs"/>
+              </a:defRPr>
+            </a:lvl1pPr>
+            <a:lvl2pPr marL="685800" indent="-228600" algn="l" defTabSz="914400" rtl="0" eaLnBrk="1" latinLnBrk="0" hangingPunct="1">
+              <a:lnSpc>
+                <a:spcPct val="150000"/>
+              </a:lnSpc>
+              <a:spcBef>
+                <a:spcPts val="500"/>
+              </a:spcBef>
+              <a:buFont typeface="Arial" panose="020B0604020202020204" pitchFamily="34" charset="0"/>
+              <a:buChar char="•"/>
+              <a:defRPr sz="1600" kern="1200">
+                <a:solidFill>
+                  <a:srgbClr val="2F3342"/>
+                </a:solidFill>
+                <a:latin typeface="+mn-lt"/>
+                <a:ea typeface="+mn-ea"/>
+                <a:cs typeface="+mn-cs"/>
+              </a:defRPr>
+            </a:lvl2pPr>
+            <a:lvl3pPr marL="1143000" indent="-228600" algn="l" defTabSz="914400" rtl="0" eaLnBrk="1" latinLnBrk="0" hangingPunct="1">
+              <a:lnSpc>
+                <a:spcPct val="150000"/>
+              </a:lnSpc>
+              <a:spcBef>
+                <a:spcPts val="500"/>
+              </a:spcBef>
+              <a:buFont typeface="Arial" panose="020B0604020202020204" pitchFamily="34" charset="0"/>
+              <a:buChar char="•"/>
+              <a:defRPr sz="1400" kern="1200">
+                <a:solidFill>
+                  <a:srgbClr val="2F3342"/>
+                </a:solidFill>
+                <a:latin typeface="+mn-lt"/>
+                <a:ea typeface="+mn-ea"/>
+                <a:cs typeface="+mn-cs"/>
+              </a:defRPr>
+            </a:lvl3pPr>
+            <a:lvl4pPr marL="1600200" indent="-228600" algn="l" defTabSz="914400" rtl="0" eaLnBrk="1" latinLnBrk="0" hangingPunct="1">
+              <a:lnSpc>
+                <a:spcPct val="150000"/>
+              </a:lnSpc>
+              <a:spcBef>
+                <a:spcPts val="500"/>
+              </a:spcBef>
+              <a:buFont typeface="Arial" panose="020B0604020202020204" pitchFamily="34" charset="0"/>
+              <a:buChar char="•"/>
+              <a:defRPr sz="1200" kern="1200">
+                <a:solidFill>
+                  <a:srgbClr val="2F3342"/>
+                </a:solidFill>
+                <a:latin typeface="+mn-lt"/>
+                <a:ea typeface="+mn-ea"/>
+                <a:cs typeface="+mn-cs"/>
+              </a:defRPr>
+            </a:lvl4pPr>
+            <a:lvl5pPr marL="2057400" indent="-228600" algn="l" defTabSz="914400" rtl="0" eaLnBrk="1" latinLnBrk="0" hangingPunct="1">
+              <a:lnSpc>
+                <a:spcPct val="150000"/>
+              </a:lnSpc>
+              <a:spcBef>
+                <a:spcPts val="500"/>
+              </a:spcBef>
+              <a:buFont typeface="Arial" panose="020B0604020202020204" pitchFamily="34" charset="0"/>
+              <a:buChar char="•"/>
+              <a:defRPr sz="1200" kern="1200">
+                <a:solidFill>
+                  <a:srgbClr val="2F3342"/>
+                </a:solidFill>
+                <a:latin typeface="+mn-lt"/>
+                <a:ea typeface="+mn-ea"/>
+                <a:cs typeface="+mn-cs"/>
+              </a:defRPr>
+            </a:lvl5pPr>
+            <a:lvl6pPr marL="2514600" indent="-228600" algn="l" defTabSz="914400" rtl="0" eaLnBrk="1" latinLnBrk="0" hangingPunct="1">
+              <a:lnSpc>
+                <a:spcPct val="90000"/>
+              </a:lnSpc>
+              <a:spcBef>
+                <a:spcPts val="500"/>
+              </a:spcBef>
+              <a:buFont typeface="Arial" panose="020B0604020202020204" pitchFamily="34" charset="0"/>
+              <a:buChar char="•"/>
+              <a:defRPr sz="1800" kern="1200">
+                <a:solidFill>
+                  <a:schemeClr val="tx1"/>
+                </a:solidFill>
+                <a:latin typeface="+mn-lt"/>
+                <a:ea typeface="+mn-ea"/>
+                <a:cs typeface="+mn-cs"/>
+              </a:defRPr>
+            </a:lvl6pPr>
+            <a:lvl7pPr marL="2971800" indent="-228600" algn="l" defTabSz="914400" rtl="0" eaLnBrk="1" latinLnBrk="0" hangingPunct="1">
+              <a:lnSpc>
+                <a:spcPct val="90000"/>
+              </a:lnSpc>
+              <a:spcBef>
+                <a:spcPts val="500"/>
+              </a:spcBef>
+              <a:buFont typeface="Arial" panose="020B0604020202020204" pitchFamily="34" charset="0"/>
+              <a:buChar char="•"/>
+              <a:defRPr sz="1800" kern="1200">
+                <a:solidFill>
+                  <a:schemeClr val="tx1"/>
+                </a:solidFill>
+                <a:latin typeface="+mn-lt"/>
+                <a:ea typeface="+mn-ea"/>
+                <a:cs typeface="+mn-cs"/>
+              </a:defRPr>
+            </a:lvl7pPr>
+            <a:lvl8pPr marL="3429000" indent="-228600" algn="l" defTabSz="914400" rtl="0" eaLnBrk="1" latinLnBrk="0" hangingPunct="1">
+              <a:lnSpc>
+                <a:spcPct val="90000"/>
+              </a:lnSpc>
+              <a:spcBef>
+                <a:spcPts val="500"/>
+              </a:spcBef>
+              <a:buFont typeface="Arial" panose="020B0604020202020204" pitchFamily="34" charset="0"/>
+              <a:buChar char="•"/>
+              <a:defRPr sz="1800" kern="1200">
+                <a:solidFill>
+                  <a:schemeClr val="tx1"/>
+                </a:solidFill>
+                <a:latin typeface="+mn-lt"/>
+                <a:ea typeface="+mn-ea"/>
+                <a:cs typeface="+mn-cs"/>
+              </a:defRPr>
+            </a:lvl8pPr>
+            <a:lvl9pPr marL="3886200" indent="-228600" algn="l" defTabSz="914400" rtl="0" eaLnBrk="1" latinLnBrk="0" hangingPunct="1">
+              <a:lnSpc>
+                <a:spcPct val="90000"/>
+              </a:lnSpc>
+              <a:spcBef>
+                <a:spcPts val="500"/>
+              </a:spcBef>
+              <a:buFont typeface="Arial" panose="020B0604020202020204" pitchFamily="34" charset="0"/>
+              <a:buChar char="•"/>
+              <a:defRPr sz="1800" kern="1200">
+                <a:solidFill>
+                  <a:schemeClr val="tx1"/>
+                </a:solidFill>
+                <a:latin typeface="+mn-lt"/>
+                <a:ea typeface="+mn-ea"/>
+                <a:cs typeface="+mn-cs"/>
+              </a:defRPr>
+            </a:lvl9pPr>
+          </a:lstStyle>
+          <a:p>
+            <a:pPr marL="0" indent="0">
+              <a:lnSpc>
+                <a:spcPct val="100000"/>
+              </a:lnSpc>
+              <a:buFont typeface="Arial" panose="020B0604020202020204" pitchFamily="34" charset="0"/>
+              <a:buNone/>
+            </a:pPr>
+            <a:r>
+              <a:rPr lang="en-US" dirty="0"/>
+              <a:t>What is a Monopoly?</a:t>
+            </a:r>
+          </a:p>
+          <a:p>
+            <a:pPr>
+              <a:lnSpc>
+                <a:spcPct val="100000"/>
+              </a:lnSpc>
+              <a:buFontTx/>
+              <a:buChar char="-"/>
+            </a:pPr>
+            <a:r>
+              <a:rPr lang="en-US" dirty="0"/>
+              <a:t>A company or business having exclusive control over a specific service.</a:t>
+            </a:r>
+          </a:p>
+          <a:p>
+            <a:pPr marL="0" indent="0">
+              <a:lnSpc>
+                <a:spcPct val="100000"/>
+              </a:lnSpc>
+              <a:buNone/>
+            </a:pPr>
+            <a:r>
+              <a:rPr lang="en-US" dirty="0"/>
+              <a:t>Strong monopoly shown through monthly listeners</a:t>
+            </a:r>
+          </a:p>
+          <a:p>
+            <a:pPr marL="0" indent="0">
+              <a:lnSpc>
+                <a:spcPct val="100000"/>
+              </a:lnSpc>
+              <a:buNone/>
+            </a:pPr>
+            <a:r>
+              <a:rPr lang="en-US" dirty="0"/>
+              <a:t>Also holds a monopoly over the “new” concept of ‘Streaming music on the Go’.</a:t>
+            </a:r>
+          </a:p>
+          <a:p>
+            <a:pPr>
+              <a:buFontTx/>
+              <a:buChar char="-"/>
+            </a:pPr>
+            <a:endParaRPr lang="en-US" dirty="0"/>
           </a:p>
         </p:txBody>
       </p:sp>
@@ -22124,6 +23139,14 @@
 </file>
 
 <file path=customXml/item1.xml><?xml version="1.0" encoding="utf-8"?>
+<p:properties xmlns:p="http://schemas.microsoft.com/office/2006/metadata/properties" xmlns:xsi="http://www.w3.org/2001/XMLSchema-instance" xmlns:pc="http://schemas.microsoft.com/office/infopath/2007/PartnerControls">
+  <documentManagement>
+    <MediaServiceKeyPoints xmlns="71af3243-3dd4-4a8d-8c0d-dd76da1f02a5" xsi:nil="true"/>
+  </documentManagement>
+</p:properties>
+</file>
+
+<file path=customXml/item2.xml><?xml version="1.0" encoding="utf-8"?>
 <ct:contentTypeSchema xmlns:ct="http://schemas.microsoft.com/office/2006/metadata/contentType" xmlns:ma="http://schemas.microsoft.com/office/2006/metadata/properties/metaAttributes" ct:_="" ma:_="" ma:contentTypeName="Document" ma:contentTypeID="0x01010079F111ED35F8CC479449609E8A0923A6" ma:contentTypeVersion="11" ma:contentTypeDescription="Create a new document." ma:contentTypeScope="" ma:versionID="96291512c1ee715ab617f4c07df79fc1">
   <xsd:schema xmlns:xsd="http://www.w3.org/2001/XMLSchema" xmlns:xs="http://www.w3.org/2001/XMLSchema" xmlns:p="http://schemas.microsoft.com/office/2006/metadata/properties" xmlns:ns2="71af3243-3dd4-4a8d-8c0d-dd76da1f02a5" xmlns:ns3="16c05727-aa75-4e4a-9b5f-8a80a1165891" targetNamespace="http://schemas.microsoft.com/office/2006/metadata/properties" ma:root="true" ma:fieldsID="8256c27c40ca5c40ce1cf6c44f0205df" ns2:_="" ns3:_="">
     <xsd:import namespace="71af3243-3dd4-4a8d-8c0d-dd76da1f02a5"/>
@@ -22334,14 +23357,6 @@
 </ct:contentTypeSchema>
 </file>
 
-<file path=customXml/item2.xml><?xml version="1.0" encoding="utf-8"?>
-<p:properties xmlns:p="http://schemas.microsoft.com/office/2006/metadata/properties" xmlns:xsi="http://www.w3.org/2001/XMLSchema-instance" xmlns:pc="http://schemas.microsoft.com/office/infopath/2007/PartnerControls">
-  <documentManagement>
-    <MediaServiceKeyPoints xmlns="71af3243-3dd4-4a8d-8c0d-dd76da1f02a5" xsi:nil="true"/>
-  </documentManagement>
-</p:properties>
-</file>
-
 <file path=customXml/item3.xml><?xml version="1.0" encoding="utf-8"?>
 <?mso-contentType ?>
 <FormTemplates xmlns="http://schemas.microsoft.com/sharepoint/v3/contenttype/forms">
@@ -22352,6 +23367,16 @@
 </file>
 
 <file path=customXml/itemProps1.xml><?xml version="1.0" encoding="utf-8"?>
+<ds:datastoreItem xmlns:ds="http://schemas.openxmlformats.org/officeDocument/2006/customXml" ds:itemID="{9B19B998-C0F0-415C-AF4D-F10DCCD30A25}">
+  <ds:schemaRefs>
+    <ds:schemaRef ds:uri="http://schemas.microsoft.com/office/2006/metadata/properties"/>
+    <ds:schemaRef ds:uri="http://schemas.microsoft.com/office/infopath/2007/PartnerControls"/>
+    <ds:schemaRef ds:uri="71af3243-3dd4-4a8d-8c0d-dd76da1f02a5"/>
+  </ds:schemaRefs>
+</ds:datastoreItem>
+</file>
+
+<file path=customXml/itemProps2.xml><?xml version="1.0" encoding="utf-8"?>
 <ds:datastoreItem xmlns:ds="http://schemas.openxmlformats.org/officeDocument/2006/customXml" ds:itemID="{6AD934DA-6EDB-4DB8-AE5C-9399A13698D6}">
   <ds:schemaRefs>
     <ds:schemaRef ds:uri="http://schemas.microsoft.com/office/2006/metadata/contentType"/>
@@ -22370,16 +23395,6 @@
 </ds:datastoreItem>
 </file>
 
-<file path=customXml/itemProps2.xml><?xml version="1.0" encoding="utf-8"?>
-<ds:datastoreItem xmlns:ds="http://schemas.openxmlformats.org/officeDocument/2006/customXml" ds:itemID="{9B19B998-C0F0-415C-AF4D-F10DCCD30A25}">
-  <ds:schemaRefs>
-    <ds:schemaRef ds:uri="http://schemas.microsoft.com/office/2006/metadata/properties"/>
-    <ds:schemaRef ds:uri="http://schemas.microsoft.com/office/infopath/2007/PartnerControls"/>
-    <ds:schemaRef ds:uri="71af3243-3dd4-4a8d-8c0d-dd76da1f02a5"/>
-  </ds:schemaRefs>
-</ds:datastoreItem>
-</file>
-
 <file path=customXml/itemProps3.xml><?xml version="1.0" encoding="utf-8"?>
 <ds:datastoreItem xmlns:ds="http://schemas.openxmlformats.org/officeDocument/2006/customXml" ds:itemID="{D27BEDAB-01B4-4BD0-9390-31AD9280078C}">
   <ds:schemaRefs>

</xml_diff>